<commit_message>
Added 5th Day topics
</commit_message>
<xml_diff>
--- a/Day_5_Training.pptx
+++ b/Day_5_Training.pptx
@@ -128,7 +128,7 @@
   </p:defaultTextStyle>
   <p:extLst>
     <p:ext uri="{EFAFB233-063F-42B5-8137-9DF3F51BA10A}">
-      <p15:sldGuideLst xmlns:p15="http://schemas.microsoft.com/office/powerpoint/2012/main">
+      <p15:sldGuideLst xmlns:p15="http://schemas.microsoft.com/office/powerpoint/2012/main" xmlns="">
         <p15:guide id="1" orient="horz" pos="2160">
           <p15:clr>
             <a:srgbClr val="A4A3A4"/>
@@ -228,7 +228,7 @@
             <a:fld id="{2DFA8FBC-D085-4302-8AB4-CB22D5B87B17}" type="datetimeFigureOut">
               <a:rPr lang="en-US" smtClean="0"/>
               <a:pPr/>
-              <a:t>6/16/2018</a:t>
+              <a:t>17-Jun-18</a:t>
             </a:fld>
             <a:endParaRPr lang="en-US"/>
           </a:p>
@@ -396,7 +396,7 @@
     </p:spTree>
     <p:extLst>
       <p:ext uri="{BB962C8B-B14F-4D97-AF65-F5344CB8AC3E}">
-        <p14:creationId xmlns:p14="http://schemas.microsoft.com/office/powerpoint/2010/main" val="3868381238"/>
+        <p14:creationId xmlns:p14="http://schemas.microsoft.com/office/powerpoint/2010/main" xmlns="" val="3868381238"/>
       </p:ext>
     </p:extLst>
   </p:cSld>
@@ -626,7 +626,7 @@
             <a:fld id="{635C9E52-7876-4467-B2E3-4E8A0FFE6CA5}" type="datetimeFigureOut">
               <a:rPr lang="en-US" smtClean="0"/>
               <a:pPr/>
-              <a:t>6/16/2018</a:t>
+              <a:t>17-Jun-18</a:t>
             </a:fld>
             <a:endParaRPr lang="en-US"/>
           </a:p>
@@ -678,7 +678,7 @@
     </p:spTree>
     <p:extLst>
       <p:ext uri="{BB962C8B-B14F-4D97-AF65-F5344CB8AC3E}">
-        <p14:creationId xmlns:p14="http://schemas.microsoft.com/office/powerpoint/2010/main" val="3169153744"/>
+        <p14:creationId xmlns:p14="http://schemas.microsoft.com/office/powerpoint/2010/main" xmlns="" val="3169153744"/>
       </p:ext>
     </p:extLst>
   </p:cSld>
@@ -796,7 +796,7 @@
             <a:fld id="{635C9E52-7876-4467-B2E3-4E8A0FFE6CA5}" type="datetimeFigureOut">
               <a:rPr lang="en-US" smtClean="0"/>
               <a:pPr/>
-              <a:t>6/16/2018</a:t>
+              <a:t>17-Jun-18</a:t>
             </a:fld>
             <a:endParaRPr lang="en-US"/>
           </a:p>
@@ -848,7 +848,7 @@
     </p:spTree>
     <p:extLst>
       <p:ext uri="{BB962C8B-B14F-4D97-AF65-F5344CB8AC3E}">
-        <p14:creationId xmlns:p14="http://schemas.microsoft.com/office/powerpoint/2010/main" val="1593433582"/>
+        <p14:creationId xmlns:p14="http://schemas.microsoft.com/office/powerpoint/2010/main" xmlns="" val="1593433582"/>
       </p:ext>
     </p:extLst>
   </p:cSld>
@@ -976,7 +976,7 @@
             <a:fld id="{635C9E52-7876-4467-B2E3-4E8A0FFE6CA5}" type="datetimeFigureOut">
               <a:rPr lang="en-US" smtClean="0"/>
               <a:pPr/>
-              <a:t>6/16/2018</a:t>
+              <a:t>17-Jun-18</a:t>
             </a:fld>
             <a:endParaRPr lang="en-US"/>
           </a:p>
@@ -1028,7 +1028,7 @@
     </p:spTree>
     <p:extLst>
       <p:ext uri="{BB962C8B-B14F-4D97-AF65-F5344CB8AC3E}">
-        <p14:creationId xmlns:p14="http://schemas.microsoft.com/office/powerpoint/2010/main" val="2045208562"/>
+        <p14:creationId xmlns:p14="http://schemas.microsoft.com/office/powerpoint/2010/main" xmlns="" val="2045208562"/>
       </p:ext>
     </p:extLst>
   </p:cSld>
@@ -1146,7 +1146,7 @@
             <a:fld id="{635C9E52-7876-4467-B2E3-4E8A0FFE6CA5}" type="datetimeFigureOut">
               <a:rPr lang="en-US" smtClean="0"/>
               <a:pPr/>
-              <a:t>6/16/2018</a:t>
+              <a:t>17-Jun-18</a:t>
             </a:fld>
             <a:endParaRPr lang="en-US"/>
           </a:p>
@@ -1198,7 +1198,7 @@
     </p:spTree>
     <p:extLst>
       <p:ext uri="{BB962C8B-B14F-4D97-AF65-F5344CB8AC3E}">
-        <p14:creationId xmlns:p14="http://schemas.microsoft.com/office/powerpoint/2010/main" val="4062740986"/>
+        <p14:creationId xmlns:p14="http://schemas.microsoft.com/office/powerpoint/2010/main" xmlns="" val="4062740986"/>
       </p:ext>
     </p:extLst>
   </p:cSld>
@@ -1393,7 +1393,7 @@
             <a:fld id="{635C9E52-7876-4467-B2E3-4E8A0FFE6CA5}" type="datetimeFigureOut">
               <a:rPr lang="en-US" smtClean="0"/>
               <a:pPr/>
-              <a:t>6/16/2018</a:t>
+              <a:t>17-Jun-18</a:t>
             </a:fld>
             <a:endParaRPr lang="en-US"/>
           </a:p>
@@ -1445,7 +1445,7 @@
     </p:spTree>
     <p:extLst>
       <p:ext uri="{BB962C8B-B14F-4D97-AF65-F5344CB8AC3E}">
-        <p14:creationId xmlns:p14="http://schemas.microsoft.com/office/powerpoint/2010/main" val="3710308980"/>
+        <p14:creationId xmlns:p14="http://schemas.microsoft.com/office/powerpoint/2010/main" xmlns="" val="3710308980"/>
       </p:ext>
     </p:extLst>
   </p:cSld>
@@ -1624,7 +1624,7 @@
             <a:fld id="{635C9E52-7876-4467-B2E3-4E8A0FFE6CA5}" type="datetimeFigureOut">
               <a:rPr lang="en-US" smtClean="0"/>
               <a:pPr/>
-              <a:t>6/16/2018</a:t>
+              <a:t>17-Jun-18</a:t>
             </a:fld>
             <a:endParaRPr lang="en-US"/>
           </a:p>
@@ -1676,7 +1676,7 @@
     </p:spTree>
     <p:extLst>
       <p:ext uri="{BB962C8B-B14F-4D97-AF65-F5344CB8AC3E}">
-        <p14:creationId xmlns:p14="http://schemas.microsoft.com/office/powerpoint/2010/main" val="999681537"/>
+        <p14:creationId xmlns:p14="http://schemas.microsoft.com/office/powerpoint/2010/main" xmlns="" val="999681537"/>
       </p:ext>
     </p:extLst>
   </p:cSld>
@@ -1990,7 +1990,7 @@
             <a:fld id="{635C9E52-7876-4467-B2E3-4E8A0FFE6CA5}" type="datetimeFigureOut">
               <a:rPr lang="en-US" smtClean="0"/>
               <a:pPr/>
-              <a:t>6/16/2018</a:t>
+              <a:t>17-Jun-18</a:t>
             </a:fld>
             <a:endParaRPr lang="en-US"/>
           </a:p>
@@ -2042,7 +2042,7 @@
     </p:spTree>
     <p:extLst>
       <p:ext uri="{BB962C8B-B14F-4D97-AF65-F5344CB8AC3E}">
-        <p14:creationId xmlns:p14="http://schemas.microsoft.com/office/powerpoint/2010/main" val="2604405924"/>
+        <p14:creationId xmlns:p14="http://schemas.microsoft.com/office/powerpoint/2010/main" xmlns="" val="2604405924"/>
       </p:ext>
     </p:extLst>
   </p:cSld>
@@ -2109,7 +2109,7 @@
             <a:fld id="{635C9E52-7876-4467-B2E3-4E8A0FFE6CA5}" type="datetimeFigureOut">
               <a:rPr lang="en-US" smtClean="0"/>
               <a:pPr/>
-              <a:t>6/16/2018</a:t>
+              <a:t>17-Jun-18</a:t>
             </a:fld>
             <a:endParaRPr lang="en-US"/>
           </a:p>
@@ -2161,7 +2161,7 @@
     </p:spTree>
     <p:extLst>
       <p:ext uri="{BB962C8B-B14F-4D97-AF65-F5344CB8AC3E}">
-        <p14:creationId xmlns:p14="http://schemas.microsoft.com/office/powerpoint/2010/main" val="3598578073"/>
+        <p14:creationId xmlns:p14="http://schemas.microsoft.com/office/powerpoint/2010/main" xmlns="" val="3598578073"/>
       </p:ext>
     </p:extLst>
   </p:cSld>
@@ -2206,7 +2206,7 @@
             <a:fld id="{635C9E52-7876-4467-B2E3-4E8A0FFE6CA5}" type="datetimeFigureOut">
               <a:rPr lang="en-US" smtClean="0"/>
               <a:pPr/>
-              <a:t>6/16/2018</a:t>
+              <a:t>17-Jun-18</a:t>
             </a:fld>
             <a:endParaRPr lang="en-US"/>
           </a:p>
@@ -2258,7 +2258,7 @@
     </p:spTree>
     <p:extLst>
       <p:ext uri="{BB962C8B-B14F-4D97-AF65-F5344CB8AC3E}">
-        <p14:creationId xmlns:p14="http://schemas.microsoft.com/office/powerpoint/2010/main" val="1343340343"/>
+        <p14:creationId xmlns:p14="http://schemas.microsoft.com/office/powerpoint/2010/main" xmlns="" val="1343340343"/>
       </p:ext>
     </p:extLst>
   </p:cSld>
@@ -2483,7 +2483,7 @@
             <a:fld id="{635C9E52-7876-4467-B2E3-4E8A0FFE6CA5}" type="datetimeFigureOut">
               <a:rPr lang="en-US" smtClean="0"/>
               <a:pPr/>
-              <a:t>6/16/2018</a:t>
+              <a:t>17-Jun-18</a:t>
             </a:fld>
             <a:endParaRPr lang="en-US"/>
           </a:p>
@@ -2535,7 +2535,7 @@
     </p:spTree>
     <p:extLst>
       <p:ext uri="{BB962C8B-B14F-4D97-AF65-F5344CB8AC3E}">
-        <p14:creationId xmlns:p14="http://schemas.microsoft.com/office/powerpoint/2010/main" val="366575480"/>
+        <p14:creationId xmlns:p14="http://schemas.microsoft.com/office/powerpoint/2010/main" xmlns="" val="366575480"/>
       </p:ext>
     </p:extLst>
   </p:cSld>
@@ -2737,7 +2737,7 @@
             <a:fld id="{635C9E52-7876-4467-B2E3-4E8A0FFE6CA5}" type="datetimeFigureOut">
               <a:rPr lang="en-US" smtClean="0"/>
               <a:pPr/>
-              <a:t>6/16/2018</a:t>
+              <a:t>17-Jun-18</a:t>
             </a:fld>
             <a:endParaRPr lang="en-US"/>
           </a:p>
@@ -2789,7 +2789,7 @@
     </p:spTree>
     <p:extLst>
       <p:ext uri="{BB962C8B-B14F-4D97-AF65-F5344CB8AC3E}">
-        <p14:creationId xmlns:p14="http://schemas.microsoft.com/office/powerpoint/2010/main" val="3892718129"/>
+        <p14:creationId xmlns:p14="http://schemas.microsoft.com/office/powerpoint/2010/main" xmlns="" val="3892718129"/>
       </p:ext>
     </p:extLst>
   </p:cSld>
@@ -2950,7 +2950,7 @@
             <a:fld id="{635C9E52-7876-4467-B2E3-4E8A0FFE6CA5}" type="datetimeFigureOut">
               <a:rPr lang="en-US" smtClean="0"/>
               <a:pPr/>
-              <a:t>6/16/2018</a:t>
+              <a:t>17-Jun-18</a:t>
             </a:fld>
             <a:endParaRPr lang="en-US"/>
           </a:p>
@@ -3038,7 +3038,7 @@
     </p:spTree>
     <p:extLst>
       <p:ext uri="{BB962C8B-B14F-4D97-AF65-F5344CB8AC3E}">
-        <p14:creationId xmlns:p14="http://schemas.microsoft.com/office/powerpoint/2010/main" val="228264506"/>
+        <p14:creationId xmlns:p14="http://schemas.microsoft.com/office/powerpoint/2010/main" xmlns="" val="228264506"/>
       </p:ext>
     </p:extLst>
   </p:cSld>
@@ -3422,7 +3422,7 @@
     </p:spTree>
     <p:extLst>
       <p:ext uri="{BB962C8B-B14F-4D97-AF65-F5344CB8AC3E}">
-        <p14:creationId xmlns:p14="http://schemas.microsoft.com/office/powerpoint/2010/main" val="1556894194"/>
+        <p14:creationId xmlns:p14="http://schemas.microsoft.com/office/powerpoint/2010/main" xmlns="" val="1556894194"/>
       </p:ext>
     </p:extLst>
   </p:cSld>
@@ -3500,14 +3500,13 @@
               <a:rPr lang="en-US" dirty="0"/>
               <a:t>The __init__.py files are required to make Python treat the directories as containing packages; this is done to prevent directories with a common name, such as string, from unintentionally hiding valid modules that occur later on the module search path. In the simplest case, __init__.py can just be an empty file, but it can also execute initialization code for the package.</a:t>
             </a:r>
-            <a:endParaRPr lang="en-US" dirty="0"/>
           </a:p>
         </p:txBody>
       </p:sp>
     </p:spTree>
     <p:extLst>
       <p:ext uri="{BB962C8B-B14F-4D97-AF65-F5344CB8AC3E}">
-        <p14:creationId xmlns:p14="http://schemas.microsoft.com/office/powerpoint/2010/main" val="2244660003"/>
+        <p14:creationId xmlns:p14="http://schemas.microsoft.com/office/powerpoint/2010/main" xmlns="" val="2244660003"/>
       </p:ext>
     </p:extLst>
   </p:cSld>
@@ -3602,14 +3601,13 @@
               <a:rPr lang="en-US" dirty="0"/>
               <a:t>Object is simply a collection of data (variables) and methods (functions) that act on those data. And, class is a blueprint for the object.</a:t>
             </a:r>
-            <a:endParaRPr lang="en-US" dirty="0"/>
           </a:p>
         </p:txBody>
       </p:sp>
     </p:spTree>
     <p:extLst>
       <p:ext uri="{BB962C8B-B14F-4D97-AF65-F5344CB8AC3E}">
-        <p14:creationId xmlns:p14="http://schemas.microsoft.com/office/powerpoint/2010/main" val="4191879039"/>
+        <p14:creationId xmlns:p14="http://schemas.microsoft.com/office/powerpoint/2010/main" xmlns="" val="4191879039"/>
       </p:ext>
     </p:extLst>
   </p:cSld>
@@ -3866,7 +3864,7 @@
     </p:spTree>
     <p:extLst>
       <p:ext uri="{BB962C8B-B14F-4D97-AF65-F5344CB8AC3E}">
-        <p14:creationId xmlns:p14="http://schemas.microsoft.com/office/powerpoint/2010/main" val="48162995"/>
+        <p14:creationId xmlns:p14="http://schemas.microsoft.com/office/powerpoint/2010/main" xmlns="" val="48162995"/>
       </p:ext>
     </p:extLst>
   </p:cSld>
@@ -4008,14 +4006,13 @@
               <a:rPr lang="en-US" dirty="0"/>
               <a:t> will be a method object.</a:t>
             </a:r>
-            <a:endParaRPr lang="en-US" dirty="0"/>
           </a:p>
         </p:txBody>
       </p:sp>
     </p:spTree>
     <p:extLst>
       <p:ext uri="{BB962C8B-B14F-4D97-AF65-F5344CB8AC3E}">
-        <p14:creationId xmlns:p14="http://schemas.microsoft.com/office/powerpoint/2010/main" val="1956096484"/>
+        <p14:creationId xmlns:p14="http://schemas.microsoft.com/office/powerpoint/2010/main" xmlns="" val="1956096484"/>
       </p:ext>
     </p:extLst>
   </p:cSld>
@@ -4103,6 +4100,7 @@
             </a:r>
           </a:p>
           <a:p>
+            <a:pPr lvl="1"/>
             <a:endParaRPr lang="en-US" dirty="0"/>
           </a:p>
           <a:p>
@@ -4127,14 +4125,13 @@
               <a:rPr lang="en-US" dirty="0"/>
               <a:t>This type of function is also called constructors in Object Oriented Programming (OOP). We normally use it to initialize all the variables.</a:t>
             </a:r>
-            <a:endParaRPr lang="en-US" dirty="0"/>
           </a:p>
         </p:txBody>
       </p:sp>
     </p:spTree>
     <p:extLst>
       <p:ext uri="{BB962C8B-B14F-4D97-AF65-F5344CB8AC3E}">
-        <p14:creationId xmlns:p14="http://schemas.microsoft.com/office/powerpoint/2010/main" val="550729082"/>
+        <p14:creationId xmlns:p14="http://schemas.microsoft.com/office/powerpoint/2010/main" xmlns="" val="550729082"/>
       </p:ext>
     </p:extLst>
   </p:cSld>
@@ -4290,7 +4287,7 @@
     </p:spTree>
     <p:extLst>
       <p:ext uri="{BB962C8B-B14F-4D97-AF65-F5344CB8AC3E}">
-        <p14:creationId xmlns:p14="http://schemas.microsoft.com/office/powerpoint/2010/main" val="615927408"/>
+        <p14:creationId xmlns:p14="http://schemas.microsoft.com/office/powerpoint/2010/main" xmlns="" val="615927408"/>
       </p:ext>
     </p:extLst>
   </p:cSld>
@@ -4618,7 +4615,7 @@
     </p:spTree>
     <p:extLst>
       <p:ext uri="{BB962C8B-B14F-4D97-AF65-F5344CB8AC3E}">
-        <p14:creationId xmlns:p14="http://schemas.microsoft.com/office/powerpoint/2010/main" val="2046318906"/>
+        <p14:creationId xmlns:p14="http://schemas.microsoft.com/office/powerpoint/2010/main" xmlns="" val="2046318906"/>
       </p:ext>
     </p:extLst>
   </p:cSld>
@@ -4750,14 +4747,13 @@
               <a:rPr lang="en-US" dirty="0"/>
               <a:t>", 80)</a:t>
             </a:r>
-            <a:endParaRPr lang="en-US" dirty="0"/>
           </a:p>
         </p:txBody>
       </p:sp>
     </p:spTree>
     <p:extLst>
       <p:ext uri="{BB962C8B-B14F-4D97-AF65-F5344CB8AC3E}">
-        <p14:creationId xmlns:p14="http://schemas.microsoft.com/office/powerpoint/2010/main" val="2623985257"/>
+        <p14:creationId xmlns:p14="http://schemas.microsoft.com/office/powerpoint/2010/main" xmlns="" val="2623985257"/>
       </p:ext>
     </p:extLst>
   </p:cSld>
@@ -5116,7 +5112,7 @@
     </p:spTree>
     <p:extLst>
       <p:ext uri="{BB962C8B-B14F-4D97-AF65-F5344CB8AC3E}">
-        <p14:creationId xmlns:p14="http://schemas.microsoft.com/office/powerpoint/2010/main" val="4096766491"/>
+        <p14:creationId xmlns:p14="http://schemas.microsoft.com/office/powerpoint/2010/main" xmlns="" val="4096766491"/>
       </p:ext>
     </p:extLst>
   </p:cSld>
@@ -5397,7 +5393,7 @@
     </p:spTree>
     <p:extLst>
       <p:ext uri="{BB962C8B-B14F-4D97-AF65-F5344CB8AC3E}">
-        <p14:creationId xmlns:p14="http://schemas.microsoft.com/office/powerpoint/2010/main" val="3137838162"/>
+        <p14:creationId xmlns:p14="http://schemas.microsoft.com/office/powerpoint/2010/main" xmlns="" val="3137838162"/>
       </p:ext>
     </p:extLst>
   </p:cSld>
@@ -5492,14 +5488,13 @@
               <a:rPr lang="en-US" dirty="0"/>
               <a:t>For instance, use your favorite text editor to create a file called fibo.py in the current directory with the following contents:</a:t>
             </a:r>
-            <a:endParaRPr lang="en-US" dirty="0"/>
           </a:p>
         </p:txBody>
       </p:sp>
     </p:spTree>
     <p:extLst>
       <p:ext uri="{BB962C8B-B14F-4D97-AF65-F5344CB8AC3E}">
-        <p14:creationId xmlns:p14="http://schemas.microsoft.com/office/powerpoint/2010/main" val="507773474"/>
+        <p14:creationId xmlns:p14="http://schemas.microsoft.com/office/powerpoint/2010/main" xmlns="" val="507773474"/>
       </p:ext>
     </p:extLst>
   </p:cSld>
@@ -5567,7 +5562,7 @@
     </p:spTree>
     <p:extLst>
       <p:ext uri="{BB962C8B-B14F-4D97-AF65-F5344CB8AC3E}">
-        <p14:creationId xmlns:p14="http://schemas.microsoft.com/office/powerpoint/2010/main" val="2587117143"/>
+        <p14:creationId xmlns:p14="http://schemas.microsoft.com/office/powerpoint/2010/main" xmlns="" val="2587117143"/>
       </p:ext>
     </p:extLst>
   </p:cSld>
@@ -5773,14 +5768,13 @@
               <a:rPr lang="en-US" dirty="0"/>
               <a:t>    return result</a:t>
             </a:r>
-            <a:endParaRPr lang="en-US" dirty="0"/>
           </a:p>
         </p:txBody>
       </p:sp>
     </p:spTree>
     <p:extLst>
       <p:ext uri="{BB962C8B-B14F-4D97-AF65-F5344CB8AC3E}">
-        <p14:creationId xmlns:p14="http://schemas.microsoft.com/office/powerpoint/2010/main" val="3245321991"/>
+        <p14:creationId xmlns:p14="http://schemas.microsoft.com/office/powerpoint/2010/main" xmlns="" val="3245321991"/>
       </p:ext>
     </p:extLst>
   </p:cSld>
@@ -5900,7 +5894,7 @@
     </p:spTree>
     <p:extLst>
       <p:ext uri="{BB962C8B-B14F-4D97-AF65-F5344CB8AC3E}">
-        <p14:creationId xmlns:p14="http://schemas.microsoft.com/office/powerpoint/2010/main" val="2328782421"/>
+        <p14:creationId xmlns:p14="http://schemas.microsoft.com/office/powerpoint/2010/main" xmlns="" val="2328782421"/>
       </p:ext>
     </p:extLst>
   </p:cSld>
@@ -6006,14 +6000,13 @@
               <a:rPr lang="en-US" dirty="0"/>
               <a:t>Modules can import other modules. It is customary but not required to place all import statements at the beginning of a module (or script, for that matter). The imported module names are placed in the importing module’s global symbol table.</a:t>
             </a:r>
-            <a:endParaRPr lang="en-US" dirty="0"/>
           </a:p>
         </p:txBody>
       </p:sp>
     </p:spTree>
     <p:extLst>
       <p:ext uri="{BB962C8B-B14F-4D97-AF65-F5344CB8AC3E}">
-        <p14:creationId xmlns:p14="http://schemas.microsoft.com/office/powerpoint/2010/main" val="847158410"/>
+        <p14:creationId xmlns:p14="http://schemas.microsoft.com/office/powerpoint/2010/main" xmlns="" val="847158410"/>
       </p:ext>
     </p:extLst>
   </p:cSld>
@@ -6247,7 +6240,7 @@
     </p:spTree>
     <p:extLst>
       <p:ext uri="{BB962C8B-B14F-4D97-AF65-F5344CB8AC3E}">
-        <p14:creationId xmlns:p14="http://schemas.microsoft.com/office/powerpoint/2010/main" val="3274927514"/>
+        <p14:creationId xmlns:p14="http://schemas.microsoft.com/office/powerpoint/2010/main" xmlns="" val="3274927514"/>
       </p:ext>
     </p:extLst>
   </p:cSld>
@@ -6436,7 +6429,7 @@
     </p:spTree>
     <p:extLst>
       <p:ext uri="{BB962C8B-B14F-4D97-AF65-F5344CB8AC3E}">
-        <p14:creationId xmlns:p14="http://schemas.microsoft.com/office/powerpoint/2010/main" val="4218827962"/>
+        <p14:creationId xmlns:p14="http://schemas.microsoft.com/office/powerpoint/2010/main" xmlns="" val="4218827962"/>
       </p:ext>
     </p:extLst>
   </p:cSld>
@@ -6596,14 +6589,13 @@
               <a:rPr lang="en-US" dirty="0"/>
               <a:t>Here is an example. Suppose we are developing a game, one possible organization of packages and modules could be as shown in the figure below.</a:t>
             </a:r>
-            <a:endParaRPr lang="en-US" dirty="0"/>
           </a:p>
         </p:txBody>
       </p:sp>
     </p:spTree>
     <p:extLst>
       <p:ext uri="{BB962C8B-B14F-4D97-AF65-F5344CB8AC3E}">
-        <p14:creationId xmlns:p14="http://schemas.microsoft.com/office/powerpoint/2010/main" val="1973927334"/>
+        <p14:creationId xmlns:p14="http://schemas.microsoft.com/office/powerpoint/2010/main" xmlns="" val="1973927334"/>
       </p:ext>
     </p:extLst>
   </p:cSld>
@@ -6686,7 +6678,7 @@
     </p:spTree>
     <p:extLst>
       <p:ext uri="{BB962C8B-B14F-4D97-AF65-F5344CB8AC3E}">
-        <p14:creationId xmlns:p14="http://schemas.microsoft.com/office/powerpoint/2010/main" val="2955989127"/>
+        <p14:creationId xmlns:p14="http://schemas.microsoft.com/office/powerpoint/2010/main" xmlns="" val="2955989127"/>
       </p:ext>
     </p:extLst>
   </p:cSld>
@@ -6985,7 +6977,7 @@
   <a:extraClrSchemeLst/>
   <a:extLst>
     <a:ext uri="{05A4C25C-085E-4340-85A3-A5531E510DB2}">
-      <thm15:themeFamily xmlns:thm15="http://schemas.microsoft.com/office/thememl/2012/main" name="Office Theme" id="{62F939B6-93AF-4DB8-9C6B-D6C7DFDC589F}" vid="{4A3C46E8-61CC-4603-A589-7422A47A8E4A}"/>
+      <thm15:themeFamily xmlns:thm15="http://schemas.microsoft.com/office/thememl/2012/main" xmlns="" name="Office Theme" id="{62F939B6-93AF-4DB8-9C6B-D6C7DFDC589F}" vid="{4A3C46E8-61CC-4603-A589-7422A47A8E4A}"/>
     </a:ext>
   </a:extLst>
 </a:theme>
@@ -7280,7 +7272,7 @@
   <a:extraClrSchemeLst/>
   <a:extLst>
     <a:ext uri="{05A4C25C-085E-4340-85A3-A5531E510DB2}">
-      <thm15:themeFamily xmlns:thm15="http://schemas.microsoft.com/office/thememl/2012/main" name="Office Theme" id="{62F939B6-93AF-4DB8-9C6B-D6C7DFDC589F}" vid="{4A3C46E8-61CC-4603-A589-7422A47A8E4A}"/>
+      <thm15:themeFamily xmlns:thm15="http://schemas.microsoft.com/office/thememl/2012/main" xmlns="" name="Office Theme" id="{62F939B6-93AF-4DB8-9C6B-D6C7DFDC589F}" vid="{4A3C46E8-61CC-4603-A589-7422A47A8E4A}"/>
     </a:ext>
   </a:extLst>
 </a:theme>

</xml_diff>